<commit_message>
review slide thay tru v2
</commit_message>
<xml_diff>
--- a/reports/tttn/thay_tru.pptx
+++ b/reports/tttn/thay_tru.pptx
@@ -5,7 +5,7 @@
     <p:sldMasterId id="2147483648" r:id="rId1"/>
   </p:sldMasterIdLst>
   <p:notesMasterIdLst>
-    <p:notesMasterId r:id="rId16"/>
+    <p:notesMasterId r:id="rId15"/>
   </p:notesMasterIdLst>
   <p:sldIdLst>
     <p:sldId id="256" r:id="rId2"/>
@@ -20,8 +20,7 @@
     <p:sldId id="277" r:id="rId11"/>
     <p:sldId id="278" r:id="rId12"/>
     <p:sldId id="279" r:id="rId13"/>
-    <p:sldId id="280" r:id="rId14"/>
-    <p:sldId id="281" r:id="rId15"/>
+    <p:sldId id="281" r:id="rId14"/>
   </p:sldIdLst>
   <p:sldSz cx="9144000" cy="6858000" type="screen4x3"/>
   <p:notesSz cx="6858000" cy="9144000"/>
@@ -222,7 +221,7 @@
             <a:fld id="{69F8ADEE-DA6F-479F-9793-942DFE9100E4}" type="datetimeFigureOut">
               <a:rPr lang="en-US" smtClean="0"/>
               <a:pPr/>
-              <a:t>14-Jun-15</a:t>
+              <a:t>15/06/2015</a:t>
             </a:fld>
             <a:endParaRPr lang="en-US"/>
           </a:p>
@@ -906,91 +905,6 @@
     </p:spTree>
     <p:extLst>
       <p:ext uri="{BB962C8B-B14F-4D97-AF65-F5344CB8AC3E}">
-        <p14:creationId xmlns:p14="http://schemas.microsoft.com/office/powerpoint/2010/main" val="44193327"/>
-      </p:ext>
-    </p:extLst>
-  </p:cSld>
-  <p:clrMapOvr>
-    <a:masterClrMapping/>
-  </p:clrMapOvr>
-</p:notes>
-</file>
-
-<file path=ppt/notesSlides/notesSlide14.xml><?xml version="1.0" encoding="utf-8"?>
-<p:notes xmlns:a="http://schemas.openxmlformats.org/drawingml/2006/main" xmlns:r="http://schemas.openxmlformats.org/officeDocument/2006/relationships" xmlns:p="http://schemas.openxmlformats.org/presentationml/2006/main">
-  <p:cSld>
-    <p:spTree>
-      <p:nvGrpSpPr>
-        <p:cNvPr id="1" name=""/>
-        <p:cNvGrpSpPr/>
-        <p:nvPr/>
-      </p:nvGrpSpPr>
-      <p:grpSpPr>
-        <a:xfrm>
-          <a:off x="0" y="0"/>
-          <a:ext cx="0" cy="0"/>
-          <a:chOff x="0" y="0"/>
-          <a:chExt cx="0" cy="0"/>
-        </a:xfrm>
-      </p:grpSpPr>
-      <p:sp>
-        <p:nvSpPr>
-          <p:cNvPr id="2" name="Slide Image Placeholder 1"/>
-          <p:cNvSpPr>
-            <a:spLocks noGrp="1" noRot="1" noChangeAspect="1"/>
-          </p:cNvSpPr>
-          <p:nvPr>
-            <p:ph type="sldImg"/>
-          </p:nvPr>
-        </p:nvSpPr>
-        <p:spPr/>
-      </p:sp>
-      <p:sp>
-        <p:nvSpPr>
-          <p:cNvPr id="3" name="Notes Placeholder 2"/>
-          <p:cNvSpPr>
-            <a:spLocks noGrp="1"/>
-          </p:cNvSpPr>
-          <p:nvPr>
-            <p:ph type="body" idx="1"/>
-          </p:nvPr>
-        </p:nvSpPr>
-        <p:spPr/>
-        <p:txBody>
-          <a:bodyPr/>
-          <a:lstStyle/>
-          <a:p>
-            <a:endParaRPr lang="en-US" dirty="0"/>
-          </a:p>
-        </p:txBody>
-      </p:sp>
-      <p:sp>
-        <p:nvSpPr>
-          <p:cNvPr id="4" name="Slide Number Placeholder 3"/>
-          <p:cNvSpPr>
-            <a:spLocks noGrp="1"/>
-          </p:cNvSpPr>
-          <p:nvPr>
-            <p:ph type="sldNum" sz="quarter" idx="10"/>
-          </p:nvPr>
-        </p:nvSpPr>
-        <p:spPr/>
-        <p:txBody>
-          <a:bodyPr/>
-          <a:lstStyle/>
-          <a:p>
-            <a:fld id="{1E8A25F1-B488-4B6B-A919-7989C5970A23}" type="slidenum">
-              <a:rPr lang="en-US" smtClean="0"/>
-              <a:pPr/>
-              <a:t>14</a:t>
-            </a:fld>
-            <a:endParaRPr lang="en-US"/>
-          </a:p>
-        </p:txBody>
-      </p:sp>
-    </p:spTree>
-    <p:extLst>
-      <p:ext uri="{BB962C8B-B14F-4D97-AF65-F5344CB8AC3E}">
         <p14:creationId xmlns:p14="http://schemas.microsoft.com/office/powerpoint/2010/main" val="1151970128"/>
       </p:ext>
     </p:extLst>
@@ -1862,7 +1776,7 @@
           <a:p>
             <a:fld id="{B65EC3BD-4A04-42F2-9937-D2ABD88EB778}" type="datetime1">
               <a:rPr lang="en-US" smtClean="0"/>
-              <a:t>14-Jun-15</a:t>
+              <a:t>15/06/2015</a:t>
             </a:fld>
             <a:endParaRPr lang="en-US"/>
           </a:p>
@@ -2023,7 +1937,7 @@
           <a:p>
             <a:fld id="{8643921A-402A-48AB-BAEE-852F9B9B0F7E}" type="datetime1">
               <a:rPr lang="en-US" smtClean="0"/>
-              <a:t>14-Jun-15</a:t>
+              <a:t>15/06/2015</a:t>
             </a:fld>
             <a:endParaRPr lang="en-US"/>
           </a:p>
@@ -2199,7 +2113,7 @@
           <a:p>
             <a:fld id="{CA1CE08C-026F-4BD9-B84F-C6D4B77E740D}" type="datetime1">
               <a:rPr lang="en-US" smtClean="0"/>
-              <a:t>14-Jun-15</a:t>
+              <a:t>15/06/2015</a:t>
             </a:fld>
             <a:endParaRPr lang="en-US"/>
           </a:p>
@@ -2365,7 +2279,7 @@
           <a:p>
             <a:fld id="{92F9EC45-0F5D-4AED-BD48-802B04DDCA02}" type="datetime1">
               <a:rPr lang="en-US" smtClean="0"/>
-              <a:t>14-Jun-15</a:t>
+              <a:t>15/06/2015</a:t>
             </a:fld>
             <a:endParaRPr lang="en-US"/>
           </a:p>
@@ -2607,7 +2521,7 @@
           <a:p>
             <a:fld id="{B5BA1394-E84E-4B9F-9128-D0725CA254B0}" type="datetime1">
               <a:rPr lang="en-US" smtClean="0"/>
-              <a:t>14-Jun-15</a:t>
+              <a:t>15/06/2015</a:t>
             </a:fld>
             <a:endParaRPr lang="en-US"/>
           </a:p>
@@ -2891,7 +2805,7 @@
           <a:p>
             <a:fld id="{F7D3380D-B93E-479B-B463-98E5D24200DC}" type="datetime1">
               <a:rPr lang="en-US" smtClean="0"/>
-              <a:t>14-Jun-15</a:t>
+              <a:t>15/06/2015</a:t>
             </a:fld>
             <a:endParaRPr lang="en-US"/>
           </a:p>
@@ -3309,7 +3223,7 @@
           <a:p>
             <a:fld id="{6295D9B5-331B-4EF8-A768-FA6F9B48D031}" type="datetime1">
               <a:rPr lang="en-US" smtClean="0"/>
-              <a:t>14-Jun-15</a:t>
+              <a:t>15/06/2015</a:t>
             </a:fld>
             <a:endParaRPr lang="en-US"/>
           </a:p>
@@ -3423,7 +3337,7 @@
           <a:p>
             <a:fld id="{FD27ECF8-9A84-4F75-9AC1-2E63C49A7960}" type="datetime1">
               <a:rPr lang="en-US" smtClean="0"/>
-              <a:t>14-Jun-15</a:t>
+              <a:t>15/06/2015</a:t>
             </a:fld>
             <a:endParaRPr lang="en-US"/>
           </a:p>
@@ -3514,7 +3428,7 @@
           <a:p>
             <a:fld id="{9E3D8D00-E399-4D92-85D1-29CA4F08D160}" type="datetime1">
               <a:rPr lang="en-US" smtClean="0"/>
-              <a:t>14-Jun-15</a:t>
+              <a:t>15/06/2015</a:t>
             </a:fld>
             <a:endParaRPr lang="en-US"/>
           </a:p>
@@ -3787,7 +3701,7 @@
           <a:p>
             <a:fld id="{8D4262DB-A5E7-46F9-9321-E7339F471910}" type="datetime1">
               <a:rPr lang="en-US" smtClean="0"/>
-              <a:t>14-Jun-15</a:t>
+              <a:t>15/06/2015</a:t>
             </a:fld>
             <a:endParaRPr lang="en-US"/>
           </a:p>
@@ -4036,7 +3950,7 @@
           <a:p>
             <a:fld id="{A1B7FF65-AFCA-4005-9416-7F0863B45A83}" type="datetime1">
               <a:rPr lang="en-US" smtClean="0"/>
-              <a:t>14-Jun-15</a:t>
+              <a:t>15/06/2015</a:t>
             </a:fld>
             <a:endParaRPr lang="en-US"/>
           </a:p>
@@ -4245,7 +4159,7 @@
           <a:p>
             <a:fld id="{02839B0C-0A1A-4F29-BE6D-285F3581F013}" type="datetime1">
               <a:rPr lang="en-US" smtClean="0"/>
-              <a:t>14-Jun-15</a:t>
+              <a:t>15/06/2015</a:t>
             </a:fld>
             <a:endParaRPr lang="en-US"/>
           </a:p>
@@ -5798,7 +5712,7 @@
           <a:graphicData uri="http://schemas.openxmlformats.org/presentationml/2006/ole">
             <mc:AlternateContent xmlns:mc="http://schemas.openxmlformats.org/markup-compatibility/2006">
               <mc:Choice xmlns:v="urn:schemas-microsoft-com:vml" Requires="v">
-                <p:oleObj spid="_x0000_s2068" r:id="rId4" imgW="5505405" imgH="3343454" progId="Visio.Drawing.15">
+                <p:oleObj spid="_x0000_s2076" r:id="rId4" imgW="5505405" imgH="3343454" progId="Visio.Drawing.15">
                   <p:embed/>
                 </p:oleObj>
               </mc:Choice>
@@ -6299,7 +6213,7 @@
           <a:graphicData uri="http://schemas.openxmlformats.org/presentationml/2006/ole">
             <mc:AlternateContent xmlns:mc="http://schemas.openxmlformats.org/markup-compatibility/2006">
               <mc:Choice xmlns:v="urn:schemas-microsoft-com:vml" Requires="v">
-                <p:oleObj spid="_x0000_s3089" r:id="rId4" imgW="6629579" imgH="3514785" progId="Visio.Drawing.15">
+                <p:oleObj spid="_x0000_s3097" r:id="rId4" imgW="6629579" imgH="3514785" progId="Visio.Drawing.15">
                   <p:embed/>
                 </p:oleObj>
               </mc:Choice>
@@ -6986,18 +6900,32 @@
               <a:t> </a:t>
             </a:r>
             <a:r>
-              <a:rPr lang="en-US" sz="3200" dirty="0" err="1" smtClean="0"/>
+              <a:rPr lang="en-US" sz="3200" err="1" smtClean="0"/>
               <a:t>kiểm</a:t>
             </a:r>
             <a:r>
-              <a:rPr lang="en-US" sz="3200" dirty="0" smtClean="0"/>
-              <a:t> </a:t>
-            </a:r>
-            <a:r>
-              <a:rPr lang="en-US" sz="3200" dirty="0" err="1" smtClean="0"/>
-              <a:t>tra</a:t>
-            </a:r>
-            <a:endParaRPr lang="en-US" sz="3200" dirty="0" smtClean="0"/>
+              <a:rPr lang="en-US" sz="3200" smtClean="0"/>
+              <a:t> tra</a:t>
+            </a:r>
+          </a:p>
+          <a:p>
+            <a:pPr marL="457200" indent="-457200">
+              <a:spcBef>
+                <a:spcPct val="20000"/>
+              </a:spcBef>
+              <a:buFont typeface="Arial" panose="020B0604020202020204" pitchFamily="34" charset="0"/>
+              <a:buChar char="•"/>
+              <a:defRPr/>
+            </a:pPr>
+            <a:r>
+              <a:rPr lang="en-US" sz="3200"/>
+              <a:t>Tập dữ liệu tiếng Việt đang được xây dựng tạm thời với 1117 mẫu trong đó có 257 mẫu đã được gán </a:t>
+            </a:r>
+            <a:r>
+              <a:rPr lang="en-US" sz="3200" smtClean="0"/>
+              <a:t>nhãn</a:t>
+            </a:r>
+            <a:endParaRPr lang="en-US" sz="3200"/>
           </a:p>
         </p:txBody>
       </p:sp>
@@ -7257,47 +7185,15 @@
             </a:pPr>
             <a:r>
               <a:rPr lang="en-US" sz="3200" dirty="0" err="1" smtClean="0"/>
-              <a:t>Tập</a:t>
-            </a:r>
-            <a:r>
-              <a:rPr lang="en-US" sz="3200" dirty="0" smtClean="0"/>
-              <a:t> </a:t>
-            </a:r>
-            <a:r>
-              <a:rPr lang="en-US" sz="3200" dirty="0" err="1" smtClean="0"/>
-              <a:t>dữ</a:t>
-            </a:r>
-            <a:r>
-              <a:rPr lang="en-US" sz="3200" dirty="0" smtClean="0"/>
-              <a:t> </a:t>
-            </a:r>
-            <a:r>
-              <a:rPr lang="en-US" sz="3200" dirty="0" err="1" smtClean="0"/>
-              <a:t>liệu</a:t>
-            </a:r>
-            <a:r>
-              <a:rPr lang="en-US" sz="3200" dirty="0" smtClean="0"/>
-              <a:t> </a:t>
-            </a:r>
-            <a:r>
-              <a:rPr lang="en-US" sz="3200" dirty="0" err="1" smtClean="0"/>
-              <a:t>tiếng</a:t>
-            </a:r>
-            <a:r>
-              <a:rPr lang="en-US" sz="3200" dirty="0" smtClean="0"/>
-              <a:t> </a:t>
-            </a:r>
-            <a:r>
-              <a:rPr lang="en-US" sz="3200" dirty="0" err="1" smtClean="0"/>
-              <a:t>Việt</a:t>
-            </a:r>
-            <a:r>
-              <a:rPr lang="en-US" sz="3200" dirty="0" smtClean="0"/>
-              <a:t> </a:t>
-            </a:r>
-            <a:r>
-              <a:rPr lang="en-US" sz="3200" dirty="0" err="1" smtClean="0"/>
-              <a:t>đang</a:t>
+              <a:t>Hiệu</a:t>
+            </a:r>
+            <a:r>
+              <a:rPr lang="en-US" sz="3200" dirty="0" smtClean="0"/>
+              <a:t> </a:t>
+            </a:r>
+            <a:r>
+              <a:rPr lang="en-US" sz="3200" dirty="0" err="1" smtClean="0"/>
+              <a:t>năng</a:t>
             </a:r>
             <a:r>
               <a:rPr lang="en-US" sz="3200" dirty="0" smtClean="0"/>
@@ -7313,361 +7209,97 @@
             </a:r>
             <a:r>
               <a:rPr lang="en-US" sz="3200" dirty="0" err="1" smtClean="0"/>
-              <a:t>xây</a:t>
-            </a:r>
-            <a:r>
-              <a:rPr lang="en-US" sz="3200" dirty="0" smtClean="0"/>
-              <a:t> </a:t>
-            </a:r>
-            <a:r>
-              <a:rPr lang="en-US" sz="3200" dirty="0" err="1" smtClean="0"/>
-              <a:t>dựng</a:t>
-            </a:r>
-            <a:r>
-              <a:rPr lang="en-US" sz="3200" dirty="0" smtClean="0"/>
-              <a:t> </a:t>
-            </a:r>
-            <a:r>
-              <a:rPr lang="en-US" sz="3200" dirty="0" err="1" smtClean="0"/>
-              <a:t>tạm</a:t>
-            </a:r>
-            <a:r>
-              <a:rPr lang="en-US" sz="3200" dirty="0" smtClean="0"/>
-              <a:t> </a:t>
-            </a:r>
-            <a:r>
-              <a:rPr lang="en-US" sz="3200" dirty="0" err="1" smtClean="0"/>
-              <a:t>thời</a:t>
-            </a:r>
-            <a:r>
-              <a:rPr lang="en-US" sz="3200" dirty="0" smtClean="0"/>
-              <a:t> </a:t>
-            </a:r>
-            <a:r>
-              <a:rPr lang="en-US" sz="3200" dirty="0" err="1" smtClean="0"/>
-              <a:t>với</a:t>
-            </a:r>
-            <a:r>
-              <a:rPr lang="en-US" sz="3200" dirty="0" smtClean="0"/>
-              <a:t> 1117 </a:t>
-            </a:r>
-            <a:r>
-              <a:rPr lang="en-US" sz="3200" dirty="0" err="1" smtClean="0"/>
-              <a:t>mẫu</a:t>
-            </a:r>
-            <a:r>
-              <a:rPr lang="en-US" sz="3200" dirty="0" smtClean="0"/>
-              <a:t> </a:t>
-            </a:r>
-            <a:r>
-              <a:rPr lang="en-US" sz="3200" dirty="0" err="1" smtClean="0"/>
-              <a:t>trong</a:t>
-            </a:r>
-            <a:r>
-              <a:rPr lang="en-US" sz="3200" dirty="0" smtClean="0"/>
-              <a:t> </a:t>
-            </a:r>
-            <a:r>
-              <a:rPr lang="en-US" sz="3200" dirty="0" err="1" smtClean="0"/>
-              <a:t>đó</a:t>
-            </a:r>
-            <a:r>
-              <a:rPr lang="en-US" sz="3200" dirty="0" smtClean="0"/>
-              <a:t> </a:t>
-            </a:r>
-            <a:r>
-              <a:rPr lang="en-US" sz="3200" dirty="0" err="1" smtClean="0"/>
-              <a:t>có</a:t>
-            </a:r>
-            <a:r>
-              <a:rPr lang="en-US" sz="3200" dirty="0" smtClean="0"/>
-              <a:t> 257 </a:t>
-            </a:r>
-            <a:r>
-              <a:rPr lang="en-US" sz="3200" dirty="0" err="1" smtClean="0"/>
-              <a:t>mẫu</a:t>
-            </a:r>
-            <a:r>
-              <a:rPr lang="en-US" sz="3200" dirty="0" smtClean="0"/>
-              <a:t> </a:t>
-            </a:r>
-            <a:r>
-              <a:rPr lang="en-US" sz="3200" dirty="0" err="1" smtClean="0"/>
-              <a:t>đã</a:t>
-            </a:r>
-            <a:r>
-              <a:rPr lang="en-US" sz="3200" dirty="0" smtClean="0"/>
-              <a:t> </a:t>
-            </a:r>
-            <a:r>
-              <a:rPr lang="en-US" sz="3200" dirty="0" err="1" smtClean="0"/>
-              <a:t>được</a:t>
-            </a:r>
-            <a:r>
-              <a:rPr lang="en-US" sz="3200" dirty="0" smtClean="0"/>
-              <a:t> </a:t>
-            </a:r>
-            <a:r>
-              <a:rPr lang="en-US" sz="3200" dirty="0" err="1" smtClean="0"/>
-              <a:t>gán</a:t>
-            </a:r>
-            <a:r>
-              <a:rPr lang="en-US" sz="3200" dirty="0" smtClean="0"/>
-              <a:t> </a:t>
-            </a:r>
-            <a:r>
-              <a:rPr lang="en-US" sz="3200" dirty="0" err="1" smtClean="0"/>
-              <a:t>nhãn</a:t>
-            </a:r>
-            <a:endParaRPr lang="en-US" sz="3200" dirty="0" smtClean="0"/>
-          </a:p>
-        </p:txBody>
-      </p:sp>
-    </p:spTree>
-    <p:extLst>
-      <p:ext uri="{BB962C8B-B14F-4D97-AF65-F5344CB8AC3E}">
-        <p14:creationId xmlns:p14="http://schemas.microsoft.com/office/powerpoint/2010/main" val="2084358540"/>
-      </p:ext>
-    </p:extLst>
-  </p:cSld>
-  <p:clrMapOvr>
-    <a:masterClrMapping/>
-  </p:clrMapOvr>
-  <p:timing>
-    <p:tnLst>
-      <p:par>
-        <p:cTn id="1" dur="indefinite" restart="never" nodeType="tmRoot"/>
-      </p:par>
-    </p:tnLst>
-  </p:timing>
-</p:sld>
-</file>
-
-<file path=ppt/slides/slide14.xml><?xml version="1.0" encoding="utf-8"?>
-<p:sld xmlns:a="http://schemas.openxmlformats.org/drawingml/2006/main" xmlns:r="http://schemas.openxmlformats.org/officeDocument/2006/relationships" xmlns:p="http://schemas.openxmlformats.org/presentationml/2006/main">
-  <p:cSld>
-    <p:spTree>
-      <p:nvGrpSpPr>
-        <p:cNvPr id="1" name=""/>
-        <p:cNvGrpSpPr/>
-        <p:nvPr/>
-      </p:nvGrpSpPr>
-      <p:grpSpPr>
-        <a:xfrm>
-          <a:off x="0" y="0"/>
-          <a:ext cx="0" cy="0"/>
-          <a:chOff x="0" y="0"/>
-          <a:chExt cx="0" cy="0"/>
-        </a:xfrm>
-      </p:grpSpPr>
-      <p:sp>
-        <p:nvSpPr>
-          <p:cNvPr id="6" name="Rectangle 9"/>
-          <p:cNvSpPr>
-            <a:spLocks noChangeArrowheads="1"/>
-          </p:cNvSpPr>
-          <p:nvPr/>
-        </p:nvSpPr>
-        <p:spPr bwMode="auto">
-          <a:xfrm>
-            <a:off x="0" y="6400800"/>
-            <a:ext cx="9144000" cy="457200"/>
-          </a:xfrm>
-          <a:prstGeom prst="rect">
-            <a:avLst/>
-          </a:prstGeom>
-          <a:solidFill>
-            <a:schemeClr val="accent1"/>
-          </a:solidFill>
-          <a:ln w="9525" algn="ctr">
-            <a:noFill/>
-            <a:round/>
-            <a:headEnd/>
-            <a:tailEnd/>
-          </a:ln>
-        </p:spPr>
-        <p:txBody>
-          <a:bodyPr/>
-          <a:lstStyle/>
-          <a:p>
-            <a:endParaRPr lang="en-US"/>
-          </a:p>
-        </p:txBody>
-      </p:sp>
-      <p:sp>
-        <p:nvSpPr>
-          <p:cNvPr id="14" name="Rectangle 3"/>
-          <p:cNvSpPr>
-            <a:spLocks/>
-          </p:cNvSpPr>
-          <p:nvPr/>
-        </p:nvSpPr>
-        <p:spPr bwMode="auto">
-          <a:xfrm>
-            <a:off x="-1" y="0"/>
-            <a:ext cx="9155401" cy="838199"/>
-          </a:xfrm>
-          <a:prstGeom prst="rect">
-            <a:avLst/>
-          </a:prstGeom>
-          <a:solidFill>
-            <a:schemeClr val="accent1"/>
-          </a:solidFill>
-          <a:ln w="19050" cap="sq">
-            <a:noFill/>
-            <a:miter lim="800000"/>
-            <a:headEnd/>
-            <a:tailEnd/>
-          </a:ln>
-        </p:spPr>
-        <p:txBody>
-          <a:bodyPr lIns="0" tIns="0" rIns="0" bIns="0"/>
-          <a:lstStyle/>
-          <a:p>
-            <a:endParaRPr lang="en-US" dirty="0"/>
-          </a:p>
-        </p:txBody>
-      </p:sp>
-      <p:sp>
-        <p:nvSpPr>
-          <p:cNvPr id="2" name="TextBox 1"/>
-          <p:cNvSpPr txBox="1"/>
-          <p:nvPr/>
-        </p:nvSpPr>
-        <p:spPr>
-          <a:xfrm>
-            <a:off x="436417" y="65156"/>
-            <a:ext cx="8212281" cy="707886"/>
-          </a:xfrm>
-          <a:prstGeom prst="rect">
-            <a:avLst/>
-          </a:prstGeom>
-          <a:noFill/>
-        </p:spPr>
-        <p:txBody>
-          <a:bodyPr wrap="square" rtlCol="0">
-            <a:spAutoFit/>
-          </a:bodyPr>
-          <a:lstStyle/>
-          <a:p>
-            <a:r>
-              <a:rPr lang="en-US" sz="4000" b="1" dirty="0" err="1" smtClean="0">
-                <a:solidFill>
-                  <a:schemeClr val="bg1"/>
-                </a:solidFill>
-              </a:rPr>
-              <a:t>Tập</a:t>
-            </a:r>
-            <a:r>
-              <a:rPr lang="en-US" sz="4000" b="1" dirty="0" smtClean="0">
-                <a:solidFill>
-                  <a:schemeClr val="bg1"/>
-                </a:solidFill>
-              </a:rPr>
-              <a:t> </a:t>
-            </a:r>
-            <a:r>
-              <a:rPr lang="en-US" sz="4000" b="1" dirty="0" err="1" smtClean="0">
-                <a:solidFill>
-                  <a:schemeClr val="bg1"/>
-                </a:solidFill>
-              </a:rPr>
-              <a:t>dữ</a:t>
-            </a:r>
-            <a:r>
-              <a:rPr lang="en-US" sz="4000" b="1" dirty="0" smtClean="0">
-                <a:solidFill>
-                  <a:schemeClr val="bg1"/>
-                </a:solidFill>
-              </a:rPr>
-              <a:t> </a:t>
-            </a:r>
-            <a:r>
-              <a:rPr lang="en-US" sz="4000" b="1" dirty="0" err="1" smtClean="0">
-                <a:solidFill>
-                  <a:schemeClr val="bg1"/>
-                </a:solidFill>
-              </a:rPr>
-              <a:t>liệu</a:t>
-            </a:r>
-            <a:r>
-              <a:rPr lang="en-US" sz="4000" b="1" dirty="0" smtClean="0">
-                <a:solidFill>
-                  <a:schemeClr val="bg1"/>
-                </a:solidFill>
-              </a:rPr>
-              <a:t> </a:t>
-            </a:r>
-            <a:r>
-              <a:rPr lang="en-US" sz="4000" b="1" dirty="0" err="1" smtClean="0">
-                <a:solidFill>
-                  <a:schemeClr val="bg1"/>
-                </a:solidFill>
-              </a:rPr>
+              <a:t>đánh</a:t>
+            </a:r>
+            <a:r>
+              <a:rPr lang="en-US" sz="3200" dirty="0" smtClean="0"/>
+              <a:t> </a:t>
+            </a:r>
+            <a:r>
+              <a:rPr lang="en-US" sz="3200" dirty="0" err="1" smtClean="0"/>
+              <a:t>giá</a:t>
+            </a:r>
+            <a:r>
+              <a:rPr lang="en-US" sz="3200" dirty="0" smtClean="0"/>
+              <a:t> qua 3 </a:t>
+            </a:r>
+            <a:r>
+              <a:rPr lang="en-US" sz="3200" dirty="0" err="1" smtClean="0"/>
+              <a:t>độ</a:t>
+            </a:r>
+            <a:r>
+              <a:rPr lang="en-US" sz="3200" dirty="0" smtClean="0"/>
+              <a:t> </a:t>
+            </a:r>
+            <a:r>
+              <a:rPr lang="en-US" sz="3200" dirty="0" err="1" smtClean="0"/>
+              <a:t>đo</a:t>
+            </a:r>
+            <a:r>
+              <a:rPr lang="en-US" sz="3200" dirty="0" smtClean="0"/>
+              <a:t>: </a:t>
+            </a:r>
+            <a:r>
+              <a:rPr lang="en-US" sz="3200" err="1" smtClean="0"/>
+              <a:t>độ</a:t>
+            </a:r>
+            <a:r>
+              <a:rPr lang="en-US" sz="3200" smtClean="0"/>
+              <a:t> chính xác (precision</a:t>
+            </a:r>
+            <a:r>
+              <a:rPr lang="en-US" sz="3200" dirty="0" smtClean="0"/>
+              <a:t>), </a:t>
+            </a:r>
+            <a:r>
+              <a:rPr lang="en-US" sz="3200" dirty="0" err="1" smtClean="0"/>
+              <a:t>độ</a:t>
+            </a:r>
+            <a:r>
+              <a:rPr lang="en-US" sz="3200" dirty="0" smtClean="0"/>
+              <a:t> </a:t>
+            </a:r>
+            <a:r>
+              <a:rPr lang="en-US" sz="3200" dirty="0" err="1" smtClean="0"/>
+              <a:t>đầy</a:t>
+            </a:r>
+            <a:r>
+              <a:rPr lang="en-US" sz="3200" dirty="0" smtClean="0"/>
+              <a:t> </a:t>
+            </a:r>
+            <a:r>
+              <a:rPr lang="en-US" sz="3200" dirty="0" err="1" smtClean="0"/>
+              <a:t>đủ</a:t>
+            </a:r>
+            <a:r>
+              <a:rPr lang="en-US" sz="3200" dirty="0" smtClean="0"/>
+              <a:t> (recall), </a:t>
+            </a:r>
+            <a:r>
+              <a:rPr lang="en-US" sz="3200" dirty="0" err="1" smtClean="0"/>
               <a:t>và</a:t>
             </a:r>
             <a:r>
-              <a:rPr lang="en-US" sz="4000" b="1" dirty="0" smtClean="0">
-                <a:solidFill>
-                  <a:schemeClr val="bg1"/>
-                </a:solidFill>
-              </a:rPr>
-              <a:t> </a:t>
-            </a:r>
-            <a:r>
-              <a:rPr lang="en-US" sz="4000" b="1" dirty="0" err="1" smtClean="0">
-                <a:solidFill>
-                  <a:schemeClr val="bg1"/>
-                </a:solidFill>
-              </a:rPr>
-              <a:t>đánh</a:t>
-            </a:r>
-            <a:r>
-              <a:rPr lang="en-US" sz="4000" b="1" dirty="0" smtClean="0">
-                <a:solidFill>
-                  <a:schemeClr val="bg1"/>
-                </a:solidFill>
-              </a:rPr>
-              <a:t> </a:t>
-            </a:r>
-            <a:r>
-              <a:rPr lang="en-US" sz="4000" b="1" dirty="0" err="1" smtClean="0">
-                <a:solidFill>
-                  <a:schemeClr val="bg1"/>
-                </a:solidFill>
-              </a:rPr>
-              <a:t>giá</a:t>
-            </a:r>
-            <a:endParaRPr lang="en-US" sz="4000" b="1" dirty="0">
-              <a:solidFill>
-                <a:schemeClr val="bg1"/>
-              </a:solidFill>
-            </a:endParaRPr>
-          </a:p>
-        </p:txBody>
-      </p:sp>
-      <p:sp>
-        <p:nvSpPr>
-          <p:cNvPr id="8" name="Rectangle 8"/>
-          <p:cNvSpPr txBox="1">
-            <a:spLocks/>
-          </p:cNvSpPr>
-          <p:nvPr/>
-        </p:nvSpPr>
-        <p:spPr>
-          <a:xfrm>
-            <a:off x="685799" y="1371600"/>
-            <a:ext cx="8262981" cy="4800600"/>
-          </a:xfrm>
-          <a:prstGeom prst="rect">
-            <a:avLst/>
-          </a:prstGeom>
-        </p:spPr>
-        <p:txBody>
-          <a:bodyPr vert="horz" lIns="91440" tIns="45720" rIns="91440" bIns="45720" rtlCol="0">
-            <a:normAutofit/>
-          </a:bodyPr>
-          <a:lstStyle/>
+              <a:rPr lang="en-US" sz="3200" dirty="0" smtClean="0"/>
+              <a:t> </a:t>
+            </a:r>
+            <a:r>
+              <a:rPr lang="en-US" sz="3200" dirty="0" err="1" smtClean="0"/>
+              <a:t>độ</a:t>
+            </a:r>
+            <a:r>
+              <a:rPr lang="en-US" sz="3200" dirty="0" smtClean="0"/>
+              <a:t> </a:t>
+            </a:r>
+            <a:r>
+              <a:rPr lang="en-US" sz="3200" dirty="0" err="1" smtClean="0"/>
+              <a:t>đo</a:t>
+            </a:r>
+            <a:r>
+              <a:rPr lang="en-US" sz="3200" dirty="0" smtClean="0"/>
+              <a:t> F (F-measure)</a:t>
+            </a:r>
+          </a:p>
           <a:p>
             <a:pPr marL="457200" indent="-457200">
               <a:spcBef>
@@ -7679,15 +7311,31 @@
             </a:pPr>
             <a:r>
               <a:rPr lang="en-US" sz="3200" dirty="0" err="1" smtClean="0"/>
-              <a:t>Hiệu</a:t>
-            </a:r>
-            <a:r>
-              <a:rPr lang="en-US" sz="3200" dirty="0" smtClean="0"/>
-              <a:t> </a:t>
-            </a:r>
-            <a:r>
-              <a:rPr lang="en-US" sz="3200" dirty="0" err="1" smtClean="0"/>
-              <a:t>năng</a:t>
+              <a:t>Các</a:t>
+            </a:r>
+            <a:r>
+              <a:rPr lang="en-US" sz="3200" dirty="0" smtClean="0"/>
+              <a:t> </a:t>
+            </a:r>
+            <a:r>
+              <a:rPr lang="en-US" sz="3200" dirty="0" err="1" smtClean="0"/>
+              <a:t>độ</a:t>
+            </a:r>
+            <a:r>
+              <a:rPr lang="en-US" sz="3200" dirty="0" smtClean="0"/>
+              <a:t> </a:t>
+            </a:r>
+            <a:r>
+              <a:rPr lang="en-US" sz="3200" dirty="0" err="1" smtClean="0"/>
+              <a:t>đo</a:t>
+            </a:r>
+            <a:r>
+              <a:rPr lang="en-US" sz="3200" dirty="0" smtClean="0"/>
+              <a:t> </a:t>
+            </a:r>
+            <a:r>
+              <a:rPr lang="en-US" sz="3200" dirty="0" err="1" smtClean="0"/>
+              <a:t>trên</a:t>
             </a:r>
             <a:r>
               <a:rPr lang="en-US" sz="3200" dirty="0" smtClean="0"/>
@@ -7703,15 +7351,7 @@
             </a:r>
             <a:r>
               <a:rPr lang="en-US" sz="3200" dirty="0" err="1" smtClean="0"/>
-              <a:t>đánh</a:t>
-            </a:r>
-            <a:r>
-              <a:rPr lang="en-US" sz="3200" dirty="0" smtClean="0"/>
-              <a:t> </a:t>
-            </a:r>
-            <a:r>
-              <a:rPr lang="en-US" sz="3200" dirty="0" err="1" smtClean="0"/>
-              <a:t>giá</a:t>
+              <a:t>tính</a:t>
             </a:r>
             <a:r>
               <a:rPr lang="en-US" sz="3200" dirty="0" smtClean="0"/>
@@ -7719,7 +7359,7 @@
             </a:r>
             <a:r>
               <a:rPr lang="en-US" sz="3200" dirty="0" err="1" smtClean="0"/>
-              <a:t>độ</a:t>
+              <a:t>hệ</a:t>
             </a:r>
             <a:r>
               <a:rPr lang="en-US" sz="3200" dirty="0" smtClean="0"/>
@@ -7731,152 +7371,6 @@
             </a:r>
             <a:r>
               <a:rPr lang="en-US" sz="3200" dirty="0" smtClean="0"/>
-              <a:t>: </a:t>
-            </a:r>
-            <a:r>
-              <a:rPr lang="en-US" sz="3200" dirty="0" err="1" smtClean="0"/>
-              <a:t>độ</a:t>
-            </a:r>
-            <a:r>
-              <a:rPr lang="en-US" sz="3200" dirty="0" smtClean="0"/>
-              <a:t> </a:t>
-            </a:r>
-            <a:r>
-              <a:rPr lang="en-US" sz="3200" dirty="0" err="1" smtClean="0"/>
-              <a:t>đúng</a:t>
-            </a:r>
-            <a:r>
-              <a:rPr lang="en-US" sz="3200" dirty="0" smtClean="0"/>
-              <a:t> </a:t>
-            </a:r>
-            <a:r>
-              <a:rPr lang="en-US" sz="3200" dirty="0" err="1" smtClean="0"/>
-              <a:t>đắn</a:t>
-            </a:r>
-            <a:r>
-              <a:rPr lang="en-US" sz="3200" dirty="0" smtClean="0"/>
-              <a:t> (precision), </a:t>
-            </a:r>
-            <a:r>
-              <a:rPr lang="en-US" sz="3200" dirty="0" err="1" smtClean="0"/>
-              <a:t>độ</a:t>
-            </a:r>
-            <a:r>
-              <a:rPr lang="en-US" sz="3200" dirty="0" smtClean="0"/>
-              <a:t> </a:t>
-            </a:r>
-            <a:r>
-              <a:rPr lang="en-US" sz="3200" dirty="0" err="1" smtClean="0"/>
-              <a:t>đầy</a:t>
-            </a:r>
-            <a:r>
-              <a:rPr lang="en-US" sz="3200" dirty="0" smtClean="0"/>
-              <a:t> </a:t>
-            </a:r>
-            <a:r>
-              <a:rPr lang="en-US" sz="3200" dirty="0" err="1" smtClean="0"/>
-              <a:t>đủ</a:t>
-            </a:r>
-            <a:r>
-              <a:rPr lang="en-US" sz="3200" dirty="0" smtClean="0"/>
-              <a:t> (recall), </a:t>
-            </a:r>
-            <a:r>
-              <a:rPr lang="en-US" sz="3200" dirty="0" err="1" smtClean="0"/>
-              <a:t>và</a:t>
-            </a:r>
-            <a:r>
-              <a:rPr lang="en-US" sz="3200" dirty="0" smtClean="0"/>
-              <a:t> </a:t>
-            </a:r>
-            <a:r>
-              <a:rPr lang="en-US" sz="3200" dirty="0" err="1" smtClean="0"/>
-              <a:t>độ</a:t>
-            </a:r>
-            <a:r>
-              <a:rPr lang="en-US" sz="3200" dirty="0" smtClean="0"/>
-              <a:t> </a:t>
-            </a:r>
-            <a:r>
-              <a:rPr lang="en-US" sz="3200" dirty="0" err="1" smtClean="0"/>
-              <a:t>đo</a:t>
-            </a:r>
-            <a:r>
-              <a:rPr lang="en-US" sz="3200" dirty="0" smtClean="0"/>
-              <a:t> F (F-measure)</a:t>
-            </a:r>
-          </a:p>
-          <a:p>
-            <a:pPr marL="457200" indent="-457200">
-              <a:spcBef>
-                <a:spcPct val="20000"/>
-              </a:spcBef>
-              <a:buFont typeface="Arial" panose="020B0604020202020204" pitchFamily="34" charset="0"/>
-              <a:buChar char="•"/>
-              <a:defRPr/>
-            </a:pPr>
-            <a:r>
-              <a:rPr lang="en-US" sz="3200" dirty="0" err="1" smtClean="0"/>
-              <a:t>Các</a:t>
-            </a:r>
-            <a:r>
-              <a:rPr lang="en-US" sz="3200" dirty="0" smtClean="0"/>
-              <a:t> </a:t>
-            </a:r>
-            <a:r>
-              <a:rPr lang="en-US" sz="3200" dirty="0" err="1" smtClean="0"/>
-              <a:t>độ</a:t>
-            </a:r>
-            <a:r>
-              <a:rPr lang="en-US" sz="3200" dirty="0" smtClean="0"/>
-              <a:t> </a:t>
-            </a:r>
-            <a:r>
-              <a:rPr lang="en-US" sz="3200" dirty="0" err="1" smtClean="0"/>
-              <a:t>đo</a:t>
-            </a:r>
-            <a:r>
-              <a:rPr lang="en-US" sz="3200" dirty="0" smtClean="0"/>
-              <a:t> </a:t>
-            </a:r>
-            <a:r>
-              <a:rPr lang="en-US" sz="3200" dirty="0" err="1" smtClean="0"/>
-              <a:t>trên</a:t>
-            </a:r>
-            <a:r>
-              <a:rPr lang="en-US" sz="3200" dirty="0" smtClean="0"/>
-              <a:t> </a:t>
-            </a:r>
-            <a:r>
-              <a:rPr lang="en-US" sz="3200" dirty="0" err="1" smtClean="0"/>
-              <a:t>được</a:t>
-            </a:r>
-            <a:r>
-              <a:rPr lang="en-US" sz="3200" dirty="0" smtClean="0"/>
-              <a:t> </a:t>
-            </a:r>
-            <a:r>
-              <a:rPr lang="en-US" sz="3200" dirty="0" err="1" smtClean="0"/>
-              <a:t>tính</a:t>
-            </a:r>
-            <a:r>
-              <a:rPr lang="en-US" sz="3200" dirty="0" smtClean="0"/>
-              <a:t> qua 3 </a:t>
-            </a:r>
-            <a:r>
-              <a:rPr lang="en-US" sz="3200" dirty="0" err="1" smtClean="0"/>
-              <a:t>hệ</a:t>
-            </a:r>
-            <a:r>
-              <a:rPr lang="en-US" sz="3200" dirty="0" smtClean="0"/>
-              <a:t> </a:t>
-            </a:r>
-            <a:r>
-              <a:rPr lang="en-US" sz="3200" dirty="0" err="1" smtClean="0"/>
-              <a:t>đo</a:t>
-            </a:r>
-            <a:r>
-              <a:rPr lang="en-US" sz="3200" dirty="0" smtClean="0"/>
               <a:t> </a:t>
             </a:r>
             <a:r>
@@ -7901,7 +7395,15 @@
             </a:r>
             <a:r>
               <a:rPr lang="en-US" sz="3200" dirty="0" smtClean="0"/>
-              <a:t> MUC, B-Cubed, CEAF</a:t>
+              <a:t> MUC</a:t>
+            </a:r>
+            <a:r>
+              <a:rPr lang="en-US" sz="3200" smtClean="0"/>
+              <a:t>, B-CUBED, </a:t>
+            </a:r>
+            <a:r>
+              <a:rPr lang="en-US" sz="3200" dirty="0" smtClean="0"/>
+              <a:t>CEAF</a:t>
             </a:r>
           </a:p>
           <a:p>
@@ -8723,22 +8225,56 @@
               <a:t> </a:t>
             </a:r>
             <a:r>
-              <a:rPr lang="en-US" sz="3200" dirty="0" err="1" smtClean="0"/>
-              <a:t>chữ</a:t>
-            </a:r>
-            <a:r>
-              <a:rPr lang="en-US" sz="3200" dirty="0" err="1" smtClean="0"/>
-              <a:t>a</a:t>
-            </a:r>
-            <a:r>
-              <a:rPr lang="en-US" sz="3200" dirty="0" smtClean="0"/>
-              <a:t> </a:t>
-            </a:r>
-            <a:r>
-              <a:rPr lang="en-US" sz="3200" dirty="0" err="1" smtClean="0"/>
-              <a:t>bệnh</a:t>
-            </a:r>
-            <a:endParaRPr lang="en-US" sz="3200" dirty="0" smtClean="0"/>
+              <a:rPr lang="en-US" sz="3200" err="1" smtClean="0"/>
+              <a:t>chữa</a:t>
+            </a:r>
+            <a:r>
+              <a:rPr lang="en-US" sz="3200" smtClean="0"/>
+              <a:t> bệnh</a:t>
+            </a:r>
+          </a:p>
+          <a:p>
+            <a:pPr marL="914400" lvl="1" indent="-457200">
+              <a:spcBef>
+                <a:spcPct val="20000"/>
+              </a:spcBef>
+              <a:buFont typeface="Arial" panose="020B0604020202020204" pitchFamily="34" charset="0"/>
+              <a:buChar char="•"/>
+              <a:defRPr/>
+            </a:pPr>
+            <a:r>
+              <a:rPr lang="en-US" sz="2800" smtClean="0"/>
+              <a:t>Phiếu điều trị</a:t>
+            </a:r>
+          </a:p>
+          <a:p>
+            <a:pPr marL="914400" lvl="1" indent="-457200">
+              <a:spcBef>
+                <a:spcPct val="20000"/>
+              </a:spcBef>
+              <a:buFont typeface="Arial" panose="020B0604020202020204" pitchFamily="34" charset="0"/>
+              <a:buChar char="•"/>
+              <a:defRPr/>
+            </a:pPr>
+            <a:r>
+              <a:rPr lang="en-US" sz="2800" smtClean="0"/>
+              <a:t>Phiếu chăm sóc</a:t>
+            </a:r>
+          </a:p>
+          <a:p>
+            <a:pPr marL="914400" lvl="1" indent="-457200">
+              <a:spcBef>
+                <a:spcPct val="20000"/>
+              </a:spcBef>
+              <a:buFont typeface="Arial" panose="020B0604020202020204" pitchFamily="34" charset="0"/>
+              <a:buChar char="•"/>
+              <a:defRPr/>
+            </a:pPr>
+            <a:r>
+              <a:rPr lang="en-US" sz="2800" smtClean="0"/>
+              <a:t>Hồ sơ xuất viện</a:t>
+            </a:r>
+            <a:endParaRPr lang="en-US" sz="2800" dirty="0" smtClean="0"/>
           </a:p>
           <a:p>
             <a:pPr marL="457200" indent="-457200">
@@ -9384,28 +8920,32 @@
               <a:t>PGĐTC </a:t>
             </a:r>
             <a:r>
-              <a:rPr lang="en-US" sz="3200" dirty="0" err="1" smtClean="0"/>
+              <a:rPr lang="en-US" sz="3200" err="1" smtClean="0"/>
               <a:t>là</a:t>
             </a:r>
             <a:r>
-              <a:rPr lang="en-US" sz="3200" dirty="0" smtClean="0"/>
-              <a:t> </a:t>
-            </a:r>
-            <a:r>
-              <a:rPr lang="en-US" sz="3200" dirty="0" err="1" smtClean="0"/>
-              <a:t>xác</a:t>
-            </a:r>
-            <a:r>
-              <a:rPr lang="en-US" sz="3200" dirty="0" smtClean="0"/>
-              <a:t>  </a:t>
-            </a:r>
-            <a:r>
-              <a:rPr lang="en-US" sz="3200" dirty="0" err="1" smtClean="0"/>
+              <a:rPr lang="en-US" sz="3200" smtClean="0"/>
+              <a:t> </a:t>
+            </a:r>
+            <a:r>
+              <a:rPr lang="en-US" sz="3200" smtClean="0"/>
+              <a:t>xác </a:t>
+            </a:r>
+            <a:r>
+              <a:rPr lang="en-US" sz="3200" err="1" smtClean="0"/>
               <a:t>định</a:t>
             </a:r>
             <a:r>
-              <a:rPr lang="en-US" sz="3200" dirty="0" smtClean="0"/>
-              <a:t> 2 </a:t>
+              <a:rPr lang="en-US" sz="3200" smtClean="0"/>
+              <a:t> </a:t>
+            </a:r>
+            <a:r>
+              <a:rPr lang="en-US" sz="3200" smtClean="0"/>
+              <a:t>hai</a:t>
+            </a:r>
+            <a:r>
+              <a:rPr lang="en-US" sz="3200" smtClean="0"/>
+              <a:t> </a:t>
             </a:r>
             <a:r>
               <a:rPr lang="en-US" sz="3200" dirty="0" err="1" smtClean="0"/>
@@ -9456,28 +8996,32 @@
               <a:t> </a:t>
             </a:r>
             <a:r>
-              <a:rPr lang="en-US" sz="3200" dirty="0" err="1" smtClean="0"/>
+              <a:rPr lang="en-US" sz="3200" err="1" smtClean="0"/>
               <a:t>cùng</a:t>
             </a:r>
             <a:r>
-              <a:rPr lang="en-US" sz="3200" dirty="0" smtClean="0"/>
-              <a:t> </a:t>
-            </a:r>
-            <a:r>
-              <a:rPr lang="en-US" sz="3200" dirty="0" err="1" smtClean="0"/>
-              <a:t>trỏ</a:t>
-            </a:r>
-            <a:r>
-              <a:rPr lang="en-US" sz="3200" dirty="0" smtClean="0"/>
-              <a:t> </a:t>
-            </a:r>
-            <a:r>
-              <a:rPr lang="en-US" sz="3200" dirty="0" err="1" smtClean="0"/>
+              <a:rPr lang="en-US" sz="3200" smtClean="0"/>
+              <a:t> </a:t>
+            </a:r>
+            <a:r>
+              <a:rPr lang="en-US" sz="3200" smtClean="0"/>
+              <a:t>chỉ</a:t>
+            </a:r>
+            <a:r>
+              <a:rPr lang="en-US" sz="3200" smtClean="0"/>
+              <a:t> </a:t>
+            </a:r>
+            <a:r>
+              <a:rPr lang="en-US" sz="3200" err="1" smtClean="0"/>
               <a:t>tới</a:t>
             </a:r>
             <a:r>
-              <a:rPr lang="en-US" sz="3200" dirty="0" smtClean="0"/>
-              <a:t> 1 </a:t>
+              <a:rPr lang="en-US" sz="3200" smtClean="0"/>
+              <a:t> </a:t>
+            </a:r>
+            <a:r>
+              <a:rPr lang="en-US" sz="3200" smtClean="0"/>
+              <a:t>một </a:t>
             </a:r>
             <a:r>
               <a:rPr lang="en-US" sz="3200" dirty="0" err="1" smtClean="0"/>
@@ -9590,7 +9134,6 @@
               <a:rPr lang="en-US" sz="3200" dirty="0" smtClean="0"/>
               <a:t>BADT</a:t>
             </a:r>
-            <a:endParaRPr lang="en-US" sz="3200" dirty="0" smtClean="0"/>
           </a:p>
         </p:txBody>
       </p:sp>
@@ -9808,12 +9351,10 @@
           </a:bodyPr>
           <a:lstStyle/>
           <a:p>
-            <a:pPr marL="457200" indent="-457200">
+            <a:pPr>
               <a:spcBef>
                 <a:spcPct val="20000"/>
               </a:spcBef>
-              <a:buFont typeface="Arial" panose="020B0604020202020204" pitchFamily="34" charset="0"/>
-              <a:buChar char="•"/>
               <a:defRPr/>
             </a:pPr>
             <a:r>
@@ -9865,18 +9406,18 @@
               <a:t> </a:t>
             </a:r>
             <a:r>
-              <a:rPr lang="en-US" sz="3200" dirty="0" err="1"/>
+              <a:rPr lang="en-US" sz="3200" err="1"/>
               <a:t>quyết</a:t>
             </a:r>
             <a:r>
-              <a:rPr lang="en-US" sz="3200" dirty="0"/>
-              <a:t> </a:t>
-            </a:r>
-            <a:r>
-              <a:rPr lang="en-US" sz="3200" dirty="0" err="1" smtClean="0"/>
+              <a:rPr lang="en-US" sz="3200"/>
+              <a:t> </a:t>
+            </a:r>
+            <a:r>
+              <a:rPr lang="en-US" sz="3200" smtClean="0"/>
               <a:t>là</a:t>
             </a:r>
-            <a:endParaRPr lang="en-US" sz="3200" dirty="0" smtClean="0"/>
+            <a:endParaRPr lang="en-US" sz="3200" dirty="0"/>
           </a:p>
           <a:p>
             <a:pPr>
@@ -10598,48 +10139,16 @@
               <a:t> </a:t>
             </a:r>
             <a:r>
-              <a:rPr lang="en-US" sz="3200" dirty="0" err="1"/>
+              <a:rPr lang="en-US" sz="3200" err="1"/>
               <a:t>tham</a:t>
             </a:r>
             <a:r>
-              <a:rPr lang="en-US" sz="3200" dirty="0"/>
-              <a:t> </a:t>
-            </a:r>
-            <a:r>
-              <a:rPr lang="en-US" sz="3200" dirty="0" err="1"/>
+              <a:rPr lang="en-US" sz="3200"/>
+              <a:t> </a:t>
+            </a:r>
+            <a:r>
+              <a:rPr lang="en-US" sz="3200" smtClean="0"/>
               <a:t>chiếu</a:t>
-            </a:r>
-            <a:r>
-              <a:rPr lang="en-US" sz="3200" dirty="0"/>
-              <a:t> </a:t>
-            </a:r>
-            <a:r>
-              <a:rPr lang="en-US" sz="3200" dirty="0" err="1"/>
-              <a:t>của</a:t>
-            </a:r>
-            <a:r>
-              <a:rPr lang="en-US" sz="3200" dirty="0"/>
-              <a:t> </a:t>
-            </a:r>
-            <a:r>
-              <a:rPr lang="en-US" sz="3200" dirty="0" err="1"/>
-              <a:t>các</a:t>
-            </a:r>
-            <a:r>
-              <a:rPr lang="en-US" sz="3200" dirty="0"/>
-              <a:t> </a:t>
-            </a:r>
-            <a:r>
-              <a:rPr lang="en-US" sz="3200" dirty="0" err="1"/>
-              <a:t>khái</a:t>
-            </a:r>
-            <a:r>
-              <a:rPr lang="en-US" sz="3200" dirty="0"/>
-              <a:t> </a:t>
-            </a:r>
-            <a:r>
-              <a:rPr lang="en-US" sz="3200" dirty="0" err="1"/>
-              <a:t>niệm</a:t>
             </a:r>
             <a:endParaRPr lang="en-US" sz="3200" b="1" dirty="0"/>
           </a:p>
@@ -11160,28 +10669,12 @@
               <a:t> </a:t>
             </a:r>
             <a:r>
-              <a:rPr lang="en-US" sz="2800" dirty="0" err="1" smtClean="0"/>
+              <a:rPr lang="en-US" sz="2800" err="1" smtClean="0"/>
               <a:t>xuất</a:t>
             </a:r>
             <a:r>
-              <a:rPr lang="en-US" sz="2800" dirty="0" smtClean="0"/>
-              <a:t> </a:t>
-            </a:r>
-            <a:r>
-              <a:rPr lang="en-US" sz="2800" dirty="0" err="1" smtClean="0"/>
-              <a:t>được</a:t>
-            </a:r>
-            <a:r>
-              <a:rPr lang="en-US" sz="2800" dirty="0" smtClean="0"/>
-              <a:t> </a:t>
-            </a:r>
-            <a:r>
-              <a:rPr lang="en-US" sz="2800" dirty="0" err="1" smtClean="0"/>
-              <a:t>dựa</a:t>
-            </a:r>
-            <a:r>
-              <a:rPr lang="en-US" sz="2800" dirty="0" smtClean="0"/>
-              <a:t> </a:t>
+              <a:rPr lang="en-US" sz="2800" smtClean="0"/>
+              <a:t> dựa </a:t>
             </a:r>
             <a:r>
               <a:rPr lang="en-US" sz="2800" dirty="0" err="1" smtClean="0"/>
@@ -11279,7 +10772,6 @@
               <a:rPr lang="en-US" sz="2800" dirty="0" smtClean="0"/>
               <a:t> 2011</a:t>
             </a:r>
-            <a:endParaRPr lang="en-US" sz="2800" dirty="0" smtClean="0"/>
           </a:p>
         </p:txBody>
       </p:sp>
@@ -11497,12 +10989,10 @@
           </a:bodyPr>
           <a:lstStyle/>
           <a:p>
-            <a:pPr marL="457200" indent="-457200">
+            <a:pPr>
               <a:spcBef>
                 <a:spcPct val="20000"/>
               </a:spcBef>
-              <a:buFont typeface="Arial" panose="020B0604020202020204" pitchFamily="34" charset="0"/>
-              <a:buChar char="•"/>
               <a:defRPr/>
             </a:pPr>
             <a:r>
@@ -11579,7 +11069,7 @@
             </a:r>
           </a:p>
           <a:p>
-            <a:pPr marL="1428750" lvl="2" indent="-514350">
+            <a:pPr marL="971550" lvl="1" indent="-514350">
               <a:spcBef>
                 <a:spcPct val="20000"/>
               </a:spcBef>
@@ -11650,7 +11140,7 @@
             <a:endParaRPr lang="en-US" sz="3200" dirty="0" smtClean="0"/>
           </a:p>
           <a:p>
-            <a:pPr marL="1428750" lvl="2" indent="-514350">
+            <a:pPr marL="971550" lvl="1" indent="-514350">
               <a:spcBef>
                 <a:spcPct val="20000"/>
               </a:spcBef>
@@ -11990,7 +11480,7 @@
           <a:graphicData uri="http://schemas.openxmlformats.org/presentationml/2006/ole">
             <mc:AlternateContent xmlns:mc="http://schemas.openxmlformats.org/markup-compatibility/2006">
               <mc:Choice xmlns:v="urn:schemas-microsoft-com:vml" Requires="v">
-                <p:oleObj spid="_x0000_s1046" r:id="rId4" imgW="3933713" imgH="3314780" progId="Visio.Drawing.15">
+                <p:oleObj spid="_x0000_s1054" r:id="rId4" imgW="3933713" imgH="3314780" progId="Visio.Drawing.15">
                   <p:embed/>
                 </p:oleObj>
               </mc:Choice>

</xml_diff>